<commit_message>
Inserted graphs created yesterday in class on PowerPoint
</commit_message>
<xml_diff>
--- a/StocksAnalysisPresentationV1.pptx
+++ b/StocksAnalysisPresentationV1.pptx
@@ -7,6 +7,10 @@
   <p:sldIdLst>
     <p:sldId id="256" r:id="rId2"/>
     <p:sldId id="257" r:id="rId3"/>
+    <p:sldId id="259" r:id="rId4"/>
+    <p:sldId id="258" r:id="rId5"/>
+    <p:sldId id="260" r:id="rId6"/>
+    <p:sldId id="261" r:id="rId7"/>
   </p:sldIdLst>
   <p:sldSz cx="12192000" cy="6858000"/>
   <p:notesSz cx="6858000" cy="9144000"/>
@@ -105,6 +109,11 @@
       </a:defRPr>
     </a:lvl9pPr>
   </p:defaultTextStyle>
+  <p:extLst>
+    <p:ext uri="{EFAFB233-063F-42B5-8137-9DF3F51BA10A}">
+      <p15:sldGuideLst xmlns:p15="http://schemas.microsoft.com/office/powerpoint/2012/main"/>
+    </p:ext>
+  </p:extLst>
 </p:presentation>
 </file>
 
@@ -278,7 +287,7 @@
           <a:p>
             <a:fld id="{48A87A34-81AB-432B-8DAE-1953F412C126}" type="datetimeFigureOut">
               <a:rPr lang="en-US" dirty="0"/>
-              <a:t>7/23/19</a:t>
+              <a:t>7/25/19</a:t>
             </a:fld>
             <a:endParaRPr lang="en-US" dirty="0"/>
           </a:p>
@@ -540,7 +549,7 @@
           <a:p>
             <a:fld id="{48A87A34-81AB-432B-8DAE-1953F412C126}" type="datetimeFigureOut">
               <a:rPr lang="en-US" dirty="0"/>
-              <a:t>7/23/19</a:t>
+              <a:t>7/25/19</a:t>
             </a:fld>
             <a:endParaRPr lang="en-US" dirty="0"/>
           </a:p>
@@ -767,7 +776,7 @@
             <a:fld id="{48A87A34-81AB-432B-8DAE-1953F412C126}" type="datetimeFigureOut">
               <a:rPr lang="en-US" dirty="0"/>
               <a:pPr/>
-              <a:t>7/23/19</a:t>
+              <a:t>7/25/19</a:t>
             </a:fld>
             <a:endParaRPr lang="en-US" dirty="0"/>
           </a:p>
@@ -1073,7 +1082,7 @@
             <a:fld id="{48A87A34-81AB-432B-8DAE-1953F412C126}" type="datetimeFigureOut">
               <a:rPr lang="en-US" dirty="0"/>
               <a:pPr/>
-              <a:t>7/23/19</a:t>
+              <a:t>7/25/19</a:t>
             </a:fld>
             <a:endParaRPr lang="en-US" dirty="0"/>
           </a:p>
@@ -1542,7 +1551,7 @@
             <a:fld id="{48A87A34-81AB-432B-8DAE-1953F412C126}" type="datetimeFigureOut">
               <a:rPr lang="en-US" dirty="0"/>
               <a:pPr/>
-              <a:t>7/23/19</a:t>
+              <a:t>7/25/19</a:t>
             </a:fld>
             <a:endParaRPr lang="en-US" dirty="0"/>
           </a:p>
@@ -2084,7 +2093,7 @@
           <a:p>
             <a:fld id="{48A87A34-81AB-432B-8DAE-1953F412C126}" type="datetimeFigureOut">
               <a:rPr lang="en-US" dirty="0"/>
-              <a:t>7/23/19</a:t>
+              <a:t>7/25/19</a:t>
             </a:fld>
             <a:endParaRPr lang="en-US" dirty="0"/>
           </a:p>
@@ -2853,7 +2862,7 @@
           <a:p>
             <a:fld id="{48A87A34-81AB-432B-8DAE-1953F412C126}" type="datetimeFigureOut">
               <a:rPr lang="en-US" dirty="0"/>
-              <a:t>7/23/19</a:t>
+              <a:t>7/25/19</a:t>
             </a:fld>
             <a:endParaRPr lang="en-US" dirty="0"/>
           </a:p>
@@ -3023,7 +3032,7 @@
           <a:p>
             <a:fld id="{48A87A34-81AB-432B-8DAE-1953F412C126}" type="datetimeFigureOut">
               <a:rPr lang="en-US" dirty="0"/>
-              <a:t>7/23/19</a:t>
+              <a:t>7/25/19</a:t>
             </a:fld>
             <a:endParaRPr lang="en-US" dirty="0"/>
           </a:p>
@@ -3242,7 +3251,7 @@
             <a:fld id="{48A87A34-81AB-432B-8DAE-1953F412C126}" type="datetimeFigureOut">
               <a:rPr lang="en-US" dirty="0"/>
               <a:pPr/>
-              <a:t>7/23/19</a:t>
+              <a:t>7/25/19</a:t>
             </a:fld>
             <a:endParaRPr lang="en-US" dirty="0"/>
           </a:p>
@@ -3417,7 +3426,7 @@
           <a:p>
             <a:fld id="{48A87A34-81AB-432B-8DAE-1953F412C126}" type="datetimeFigureOut">
               <a:rPr lang="en-US" dirty="0"/>
-              <a:t>7/23/19</a:t>
+              <a:t>7/25/19</a:t>
             </a:fld>
             <a:endParaRPr lang="en-US" dirty="0"/>
           </a:p>
@@ -3702,7 +3711,7 @@
             <a:fld id="{48A87A34-81AB-432B-8DAE-1953F412C126}" type="datetimeFigureOut">
               <a:rPr lang="en-US" dirty="0"/>
               <a:pPr/>
-              <a:t>7/23/19</a:t>
+              <a:t>7/25/19</a:t>
             </a:fld>
             <a:endParaRPr lang="en-US" dirty="0"/>
           </a:p>
@@ -3939,7 +3948,7 @@
           <a:p>
             <a:fld id="{48A87A34-81AB-432B-8DAE-1953F412C126}" type="datetimeFigureOut">
               <a:rPr lang="en-US" dirty="0"/>
-              <a:t>7/23/19</a:t>
+              <a:t>7/25/19</a:t>
             </a:fld>
             <a:endParaRPr lang="en-US" dirty="0"/>
           </a:p>
@@ -4313,7 +4322,7 @@
           <a:p>
             <a:fld id="{48A87A34-81AB-432B-8DAE-1953F412C126}" type="datetimeFigureOut">
               <a:rPr lang="en-US" dirty="0"/>
-              <a:t>7/23/19</a:t>
+              <a:t>7/25/19</a:t>
             </a:fld>
             <a:endParaRPr lang="en-US" dirty="0"/>
           </a:p>
@@ -4426,7 +4435,7 @@
           <a:p>
             <a:fld id="{48A87A34-81AB-432B-8DAE-1953F412C126}" type="datetimeFigureOut">
               <a:rPr lang="en-US" dirty="0"/>
-              <a:t>7/23/19</a:t>
+              <a:t>7/25/19</a:t>
             </a:fld>
             <a:endParaRPr lang="en-US" dirty="0"/>
           </a:p>
@@ -4516,7 +4525,7 @@
           <a:p>
             <a:fld id="{48A87A34-81AB-432B-8DAE-1953F412C126}" type="datetimeFigureOut">
               <a:rPr lang="en-US" dirty="0"/>
-              <a:t>7/23/19</a:t>
+              <a:t>7/25/19</a:t>
             </a:fld>
             <a:endParaRPr lang="en-US" dirty="0"/>
           </a:p>
@@ -4760,7 +4769,7 @@
           <a:p>
             <a:fld id="{48A87A34-81AB-432B-8DAE-1953F412C126}" type="datetimeFigureOut">
               <a:rPr lang="en-US" dirty="0"/>
-              <a:t>7/23/19</a:t>
+              <a:t>7/25/19</a:t>
             </a:fld>
             <a:endParaRPr lang="en-US" dirty="0"/>
           </a:p>
@@ -5012,7 +5021,7 @@
           <a:p>
             <a:fld id="{48A87A34-81AB-432B-8DAE-1953F412C126}" type="datetimeFigureOut">
               <a:rPr lang="en-US" dirty="0"/>
-              <a:t>7/23/19</a:t>
+              <a:t>7/25/19</a:t>
             </a:fld>
             <a:endParaRPr lang="en-US" dirty="0"/>
           </a:p>
@@ -5251,7 +5260,7 @@
             <a:fld id="{48A87A34-81AB-432B-8DAE-1953F412C126}" type="datetimeFigureOut">
               <a:rPr lang="en-US" dirty="0"/>
               <a:pPr/>
-              <a:t>7/23/19</a:t>
+              <a:t>7/25/19</a:t>
             </a:fld>
             <a:endParaRPr lang="en-US" dirty="0"/>
           </a:p>
@@ -5816,21 +5825,28 @@
           <a:p>
             <a:r>
               <a:rPr lang="en-US" dirty="0"/>
-              <a:t>Do weekends and holidays actually affect the market?  Does it affect industries differently?</a:t>
+              <a:t>Do weekends actually affect the market?  Does it affect industries differently?</a:t>
             </a:r>
           </a:p>
           <a:p>
             <a:r>
               <a:rPr lang="en-US" dirty="0"/>
-              <a:t>Ho=Weekends and holidays have no impact on the stock market </a:t>
-            </a:r>
-          </a:p>
-          <a:p>
-            <a:r>
-              <a:rPr lang="en-US"/>
-              <a:t>Ha=Weekends and holidays will cause the market to have a fluctuation (up or down) right before the weekend or the holiday </a:t>
-            </a:r>
-            <a:endParaRPr lang="en-US" dirty="0"/>
+              <a:t>Ho=Weekends have no impact on the stock market </a:t>
+            </a:r>
+          </a:p>
+          <a:p>
+            <a:r>
+              <a:rPr lang="en-US" dirty="0"/>
+              <a:t>Ha=</a:t>
+            </a:r>
+            <a:r>
+              <a:rPr lang="en-US"/>
+              <a:t>Weekends will </a:t>
+            </a:r>
+            <a:r>
+              <a:rPr lang="en-US" dirty="0"/>
+              <a:t>cause the market to have a fluctuation (up or down) right before the weekend or the holiday </a:t>
+            </a:r>
           </a:p>
         </p:txBody>
       </p:sp>
@@ -5838,6 +5854,339 @@
     <p:extLst>
       <p:ext uri="{BB962C8B-B14F-4D97-AF65-F5344CB8AC3E}">
         <p14:creationId xmlns:p14="http://schemas.microsoft.com/office/powerpoint/2010/main" val="4146615721"/>
+      </p:ext>
+    </p:extLst>
+  </p:cSld>
+  <p:clrMapOvr>
+    <a:masterClrMapping/>
+  </p:clrMapOvr>
+</p:sld>
+</file>
+
+<file path=ppt/slides/slide3.xml><?xml version="1.0" encoding="utf-8"?>
+<p:sld xmlns:a="http://schemas.openxmlformats.org/drawingml/2006/main" xmlns:r="http://schemas.openxmlformats.org/officeDocument/2006/relationships" xmlns:p="http://schemas.openxmlformats.org/presentationml/2006/main">
+  <p:cSld>
+    <p:spTree>
+      <p:nvGrpSpPr>
+        <p:cNvPr id="1" name=""/>
+        <p:cNvGrpSpPr/>
+        <p:nvPr/>
+      </p:nvGrpSpPr>
+      <p:grpSpPr>
+        <a:xfrm>
+          <a:off x="0" y="0"/>
+          <a:ext cx="0" cy="0"/>
+          <a:chOff x="0" y="0"/>
+          <a:chExt cx="0" cy="0"/>
+        </a:xfrm>
+      </p:grpSpPr>
+      <p:sp>
+        <p:nvSpPr>
+          <p:cNvPr id="2" name="Title 1">
+            <a:extLst>
+              <a:ext uri="{FF2B5EF4-FFF2-40B4-BE49-F238E27FC236}">
+                <a16:creationId xmlns:a16="http://schemas.microsoft.com/office/drawing/2014/main" id="{9CA4D774-92D3-194B-AC76-DA41C7446230}"/>
+              </a:ext>
+            </a:extLst>
+          </p:cNvPr>
+          <p:cNvSpPr>
+            <a:spLocks noGrp="1"/>
+          </p:cNvSpPr>
+          <p:nvPr>
+            <p:ph type="title"/>
+          </p:nvPr>
+        </p:nvSpPr>
+        <p:spPr/>
+        <p:txBody>
+          <a:bodyPr/>
+          <a:lstStyle/>
+          <a:p>
+            <a:r>
+              <a:rPr lang="en-US" dirty="0"/>
+              <a:t>Close by Ticker over time</a:t>
+            </a:r>
+          </a:p>
+        </p:txBody>
+      </p:sp>
+      <p:pic>
+        <p:nvPicPr>
+          <p:cNvPr id="5" name="Content Placeholder 4">
+            <a:extLst>
+              <a:ext uri="{FF2B5EF4-FFF2-40B4-BE49-F238E27FC236}">
+                <a16:creationId xmlns:a16="http://schemas.microsoft.com/office/drawing/2014/main" id="{6D489954-F86C-5A4C-821A-3A58BFC87836}"/>
+              </a:ext>
+            </a:extLst>
+          </p:cNvPr>
+          <p:cNvPicPr>
+            <a:picLocks noGrp="1" noChangeAspect="1"/>
+          </p:cNvPicPr>
+          <p:nvPr>
+            <p:ph idx="1"/>
+          </p:nvPr>
+        </p:nvPicPr>
+        <p:blipFill rotWithShape="1">
+          <a:blip r:embed="rId2"/>
+          <a:srcRect l="371" t="46921" b="-1"/>
+          <a:stretch/>
+        </p:blipFill>
+        <p:spPr>
+          <a:xfrm>
+            <a:off x="790067" y="2565408"/>
+            <a:ext cx="10611866" cy="3528219"/>
+          </a:xfrm>
+        </p:spPr>
+      </p:pic>
+    </p:spTree>
+    <p:extLst>
+      <p:ext uri="{BB962C8B-B14F-4D97-AF65-F5344CB8AC3E}">
+        <p14:creationId xmlns:p14="http://schemas.microsoft.com/office/powerpoint/2010/main" val="2882076673"/>
+      </p:ext>
+    </p:extLst>
+  </p:cSld>
+  <p:clrMapOvr>
+    <a:masterClrMapping/>
+  </p:clrMapOvr>
+</p:sld>
+</file>
+
+<file path=ppt/slides/slide4.xml><?xml version="1.0" encoding="utf-8"?>
+<p:sld xmlns:a="http://schemas.openxmlformats.org/drawingml/2006/main" xmlns:r="http://schemas.openxmlformats.org/officeDocument/2006/relationships" xmlns:p="http://schemas.openxmlformats.org/presentationml/2006/main">
+  <p:cSld>
+    <p:spTree>
+      <p:nvGrpSpPr>
+        <p:cNvPr id="1" name=""/>
+        <p:cNvGrpSpPr/>
+        <p:nvPr/>
+      </p:nvGrpSpPr>
+      <p:grpSpPr>
+        <a:xfrm>
+          <a:off x="0" y="0"/>
+          <a:ext cx="0" cy="0"/>
+          <a:chOff x="0" y="0"/>
+          <a:chExt cx="0" cy="0"/>
+        </a:xfrm>
+      </p:grpSpPr>
+      <p:sp>
+        <p:nvSpPr>
+          <p:cNvPr id="2" name="Title 1">
+            <a:extLst>
+              <a:ext uri="{FF2B5EF4-FFF2-40B4-BE49-F238E27FC236}">
+                <a16:creationId xmlns:a16="http://schemas.microsoft.com/office/drawing/2014/main" id="{A2D3F81F-75E1-D643-88F4-C4DFCAC2D3B3}"/>
+              </a:ext>
+            </a:extLst>
+          </p:cNvPr>
+          <p:cNvSpPr>
+            <a:spLocks noGrp="1"/>
+          </p:cNvSpPr>
+          <p:nvPr>
+            <p:ph type="title"/>
+          </p:nvPr>
+        </p:nvSpPr>
+        <p:spPr/>
+        <p:txBody>
+          <a:bodyPr/>
+          <a:lstStyle/>
+          <a:p>
+            <a:r>
+              <a:rPr lang="en-US" dirty="0"/>
+              <a:t>Boxplot by Ticker</a:t>
+            </a:r>
+          </a:p>
+        </p:txBody>
+      </p:sp>
+      <p:pic>
+        <p:nvPicPr>
+          <p:cNvPr id="5" name="Content Placeholder 4">
+            <a:extLst>
+              <a:ext uri="{FF2B5EF4-FFF2-40B4-BE49-F238E27FC236}">
+                <a16:creationId xmlns:a16="http://schemas.microsoft.com/office/drawing/2014/main" id="{E39A7539-6FD9-9E49-A160-734D2EA5AAAC}"/>
+              </a:ext>
+            </a:extLst>
+          </p:cNvPr>
+          <p:cNvPicPr>
+            <a:picLocks noGrp="1" noChangeAspect="1"/>
+          </p:cNvPicPr>
+          <p:nvPr>
+            <p:ph idx="1"/>
+          </p:nvPr>
+        </p:nvPicPr>
+        <p:blipFill>
+          <a:blip r:embed="rId2"/>
+          <a:stretch>
+            <a:fillRect/>
+          </a:stretch>
+        </p:blipFill>
+        <p:spPr>
+          <a:xfrm>
+            <a:off x="1937705" y="1775400"/>
+            <a:ext cx="7674379" cy="4666389"/>
+          </a:xfrm>
+        </p:spPr>
+      </p:pic>
+    </p:spTree>
+    <p:extLst>
+      <p:ext uri="{BB962C8B-B14F-4D97-AF65-F5344CB8AC3E}">
+        <p14:creationId xmlns:p14="http://schemas.microsoft.com/office/powerpoint/2010/main" val="2465604350"/>
+      </p:ext>
+    </p:extLst>
+  </p:cSld>
+  <p:clrMapOvr>
+    <a:masterClrMapping/>
+  </p:clrMapOvr>
+</p:sld>
+</file>
+
+<file path=ppt/slides/slide5.xml><?xml version="1.0" encoding="utf-8"?>
+<p:sld xmlns:a="http://schemas.openxmlformats.org/drawingml/2006/main" xmlns:r="http://schemas.openxmlformats.org/officeDocument/2006/relationships" xmlns:p="http://schemas.openxmlformats.org/presentationml/2006/main">
+  <p:cSld>
+    <p:spTree>
+      <p:nvGrpSpPr>
+        <p:cNvPr id="1" name=""/>
+        <p:cNvGrpSpPr/>
+        <p:nvPr/>
+      </p:nvGrpSpPr>
+      <p:grpSpPr>
+        <a:xfrm>
+          <a:off x="0" y="0"/>
+          <a:ext cx="0" cy="0"/>
+          <a:chOff x="0" y="0"/>
+          <a:chExt cx="0" cy="0"/>
+        </a:xfrm>
+      </p:grpSpPr>
+      <p:sp>
+        <p:nvSpPr>
+          <p:cNvPr id="2" name="Title 1">
+            <a:extLst>
+              <a:ext uri="{FF2B5EF4-FFF2-40B4-BE49-F238E27FC236}">
+                <a16:creationId xmlns:a16="http://schemas.microsoft.com/office/drawing/2014/main" id="{6CA23985-4BEA-9042-A42A-91DBE5C63E98}"/>
+              </a:ext>
+            </a:extLst>
+          </p:cNvPr>
+          <p:cNvSpPr>
+            <a:spLocks noGrp="1"/>
+          </p:cNvSpPr>
+          <p:nvPr>
+            <p:ph type="title"/>
+          </p:nvPr>
+        </p:nvSpPr>
+        <p:spPr/>
+        <p:txBody>
+          <a:bodyPr/>
+          <a:lstStyle/>
+          <a:p>
+            <a:endParaRPr lang="en-US"/>
+          </a:p>
+        </p:txBody>
+      </p:sp>
+      <p:sp>
+        <p:nvSpPr>
+          <p:cNvPr id="3" name="Content Placeholder 2">
+            <a:extLst>
+              <a:ext uri="{FF2B5EF4-FFF2-40B4-BE49-F238E27FC236}">
+                <a16:creationId xmlns:a16="http://schemas.microsoft.com/office/drawing/2014/main" id="{E8A94A54-5321-0049-A286-92B3D673B5D5}"/>
+              </a:ext>
+            </a:extLst>
+          </p:cNvPr>
+          <p:cNvSpPr>
+            <a:spLocks noGrp="1"/>
+          </p:cNvSpPr>
+          <p:nvPr>
+            <p:ph idx="1"/>
+          </p:nvPr>
+        </p:nvSpPr>
+        <p:spPr/>
+        <p:txBody>
+          <a:bodyPr/>
+          <a:lstStyle/>
+          <a:p>
+            <a:endParaRPr lang="en-US"/>
+          </a:p>
+        </p:txBody>
+      </p:sp>
+    </p:spTree>
+    <p:extLst>
+      <p:ext uri="{BB962C8B-B14F-4D97-AF65-F5344CB8AC3E}">
+        <p14:creationId xmlns:p14="http://schemas.microsoft.com/office/powerpoint/2010/main" val="261923854"/>
+      </p:ext>
+    </p:extLst>
+  </p:cSld>
+  <p:clrMapOvr>
+    <a:masterClrMapping/>
+  </p:clrMapOvr>
+</p:sld>
+</file>
+
+<file path=ppt/slides/slide6.xml><?xml version="1.0" encoding="utf-8"?>
+<p:sld xmlns:a="http://schemas.openxmlformats.org/drawingml/2006/main" xmlns:r="http://schemas.openxmlformats.org/officeDocument/2006/relationships" xmlns:p="http://schemas.openxmlformats.org/presentationml/2006/main">
+  <p:cSld>
+    <p:spTree>
+      <p:nvGrpSpPr>
+        <p:cNvPr id="1" name=""/>
+        <p:cNvGrpSpPr/>
+        <p:nvPr/>
+      </p:nvGrpSpPr>
+      <p:grpSpPr>
+        <a:xfrm>
+          <a:off x="0" y="0"/>
+          <a:ext cx="0" cy="0"/>
+          <a:chOff x="0" y="0"/>
+          <a:chExt cx="0" cy="0"/>
+        </a:xfrm>
+      </p:grpSpPr>
+      <p:sp>
+        <p:nvSpPr>
+          <p:cNvPr id="2" name="Title 1">
+            <a:extLst>
+              <a:ext uri="{FF2B5EF4-FFF2-40B4-BE49-F238E27FC236}">
+                <a16:creationId xmlns:a16="http://schemas.microsoft.com/office/drawing/2014/main" id="{785D1533-EA7A-2E42-8830-ACC6D57FD4BB}"/>
+              </a:ext>
+            </a:extLst>
+          </p:cNvPr>
+          <p:cNvSpPr>
+            <a:spLocks noGrp="1"/>
+          </p:cNvSpPr>
+          <p:nvPr>
+            <p:ph type="title"/>
+          </p:nvPr>
+        </p:nvSpPr>
+        <p:spPr/>
+        <p:txBody>
+          <a:bodyPr/>
+          <a:lstStyle/>
+          <a:p>
+            <a:endParaRPr lang="en-US"/>
+          </a:p>
+        </p:txBody>
+      </p:sp>
+      <p:sp>
+        <p:nvSpPr>
+          <p:cNvPr id="3" name="Content Placeholder 2">
+            <a:extLst>
+              <a:ext uri="{FF2B5EF4-FFF2-40B4-BE49-F238E27FC236}">
+                <a16:creationId xmlns:a16="http://schemas.microsoft.com/office/drawing/2014/main" id="{A7D357C8-6BF6-3F49-87B8-2CDA2F565863}"/>
+              </a:ext>
+            </a:extLst>
+          </p:cNvPr>
+          <p:cNvSpPr>
+            <a:spLocks noGrp="1"/>
+          </p:cNvSpPr>
+          <p:nvPr>
+            <p:ph idx="1"/>
+          </p:nvPr>
+        </p:nvSpPr>
+        <p:spPr/>
+        <p:txBody>
+          <a:bodyPr/>
+          <a:lstStyle/>
+          <a:p>
+            <a:endParaRPr lang="en-US"/>
+          </a:p>
+        </p:txBody>
+      </p:sp>
+    </p:spTree>
+    <p:extLst>
+      <p:ext uri="{BB962C8B-B14F-4D97-AF65-F5344CB8AC3E}">
+        <p14:creationId xmlns:p14="http://schemas.microsoft.com/office/powerpoint/2010/main" val="3800935489"/>
       </p:ext>
     </p:extLst>
   </p:cSld>

</xml_diff>